<commit_message>
Changes, add SKID LINES
</commit_message>
<xml_diff>
--- a/one-template-to-rule-them-all_emet-part.pptx
+++ b/one-template-to-rule-them-all_emet-part.pptx
@@ -168,7 +168,7 @@
             </a:lvl1pPr>
           </a:lstStyle>
           <a:p>
-            <a:endParaRPr lang="en-GB"/>
+            <a:endParaRPr lang="en-GB" dirty="0"/>
           </a:p>
         </p:txBody>
       </p:sp>
@@ -203,7 +203,7 @@
               <a:rPr lang="en-GB" smtClean="0"/>
               <a:t>31/05/2016</a:t>
             </a:fld>
-            <a:endParaRPr lang="en-GB"/>
+            <a:endParaRPr lang="en-GB" dirty="0"/>
           </a:p>
         </p:txBody>
       </p:sp>
@@ -234,7 +234,7 @@
             </a:lvl1pPr>
           </a:lstStyle>
           <a:p>
-            <a:endParaRPr lang="en-GB"/>
+            <a:endParaRPr lang="en-GB" dirty="0"/>
           </a:p>
         </p:txBody>
       </p:sp>
@@ -269,7 +269,7 @@
               <a:rPr lang="en-GB" smtClean="0"/>
               <a:t>‹#›</a:t>
             </a:fld>
-            <a:endParaRPr lang="en-GB"/>
+            <a:endParaRPr lang="en-GB" dirty="0"/>
           </a:p>
         </p:txBody>
       </p:sp>
@@ -330,7 +330,7 @@
           <a:lstStyle/>
           <a:p>
             <a:pPr lvl="0"/>
-            <a:endParaRPr/>
+            <a:endParaRPr dirty="0"/>
           </a:p>
         </p:txBody>
       </p:sp>
@@ -520,40 +520,25 @@
           <a:p>
             <a:r>
               <a:rPr lang="en-US" dirty="0" smtClean="0"/>
-              <a:t>Hello everyone and thanks</a:t>
+              <a:t>Hello everyone</a:t>
             </a:r>
             <a:r>
               <a:rPr lang="en-US" baseline="0" dirty="0" smtClean="0"/>
-              <a:t> for coming to our QNX security talk titled QNX – 99 problems but a microkernel </a:t>
-            </a:r>
-            <a:r>
-              <a:rPr lang="en-US" baseline="0" dirty="0" err="1" smtClean="0"/>
-              <a:t>ain’t</a:t>
+              <a:t>, our talk is titled ‘One Template To Rule Them All’</a:t>
+            </a:r>
+          </a:p>
+          <a:p>
+            <a:endParaRPr lang="en-US" dirty="0" smtClean="0"/>
+          </a:p>
+          <a:p>
+            <a:r>
+              <a:rPr lang="en-US" dirty="0" smtClean="0"/>
+              <a:t>Kostas</a:t>
             </a:r>
             <a:r>
               <a:rPr lang="en-US" baseline="0" dirty="0" smtClean="0"/>
-              <a:t> one!</a:t>
-            </a:r>
-          </a:p>
-          <a:p>
-            <a:endParaRPr lang="en-US" baseline="0" dirty="0" smtClean="0"/>
-          </a:p>
-          <a:p>
-            <a:r>
-              <a:rPr lang="en-US" baseline="0" dirty="0" smtClean="0"/>
-              <a:t>Alex </a:t>
-            </a:r>
-            <a:r>
-              <a:rPr lang="en-US" baseline="0" dirty="0" err="1" smtClean="0"/>
-              <a:t>Plaskett</a:t>
-            </a:r>
-            <a:r>
-              <a:rPr lang="en-US" baseline="0" dirty="0" smtClean="0"/>
-              <a:t> and I are security researchers for MWR in the UK and today we’ll be sharing our findings from looking at the QNX operating system.</a:t>
-            </a:r>
-            <a:endParaRPr lang="en-US" dirty="0" smtClean="0"/>
-          </a:p>
-          <a:p>
+              <a:t> and I are security consultants for MWR in the UK and today we’ll be sharing an overview of how Microsoft Office macros can be used in different ways as part of an APT.</a:t>
+            </a:r>
             <a:endParaRPr lang="en-US" dirty="0"/>
           </a:p>
         </p:txBody>
@@ -692,7 +677,6 @@
               <a:rPr lang="en-GB" baseline="0" dirty="0" smtClean="0"/>
               <a:t>, Cobalt Strike and PowerShell Empire. Some of these will be blocked by EMET.</a:t>
             </a:r>
-            <a:endParaRPr lang="en-GB" baseline="0" dirty="0" smtClean="0"/>
           </a:p>
         </p:txBody>
       </p:sp>
@@ -804,7 +788,6 @@
               <a:rPr lang="en-GB" baseline="0" dirty="0" smtClean="0"/>
               <a:t> outputs a payload that makes use of VBA code to inject shell code into itself. For example, if the payload was opened in Microsoft Word, it would run in WINWORD.exe. This payload would fail if EMET is enabled on Word.</a:t>
             </a:r>
-            <a:endParaRPr lang="en-GB" baseline="0" dirty="0" smtClean="0"/>
           </a:p>
         </p:txBody>
       </p:sp>
@@ -904,8 +887,38 @@
             </a:r>
             <a:r>
               <a:rPr lang="en-GB" baseline="0" dirty="0" smtClean="0"/>
-              <a:t>, the macro payload generated will spawn Rundll32.exe in it’s 32 bit format regardless of the system architecture it is ran on and inject shell code into it. This payload would fail if Rundll32.exe is blocked or EMET is protecting Rundll32.exe.</a:t>
-            </a:r>
+              <a:t>, the macro payload generated will spawn Rundll32.exe in it’s 32 bit format regardless of the system architecture it is ran on and inject shell code into it. This payload would fail if Rundll32.exe is blocked or EMET is protecting Rundll32.exe</a:t>
+            </a:r>
+            <a:r>
+              <a:rPr lang="en-GB" baseline="0" dirty="0" smtClean="0"/>
+              <a:t>.</a:t>
+            </a:r>
+          </a:p>
+          <a:p>
+            <a:endParaRPr lang="en-GB" baseline="0" dirty="0" smtClean="0"/>
+          </a:p>
+          <a:p>
+            <a:r>
+              <a:rPr lang="en-GB" baseline="0" dirty="0" smtClean="0"/>
+              <a:t>Suggestion in general to stop all the </a:t>
+            </a:r>
+            <a:r>
+              <a:rPr lang="en-GB" baseline="0" dirty="0" err="1" smtClean="0"/>
+              <a:t>CobaltStrike</a:t>
+            </a:r>
+            <a:r>
+              <a:rPr lang="en-GB" baseline="0" dirty="0" smtClean="0"/>
+              <a:t> copy and </a:t>
+            </a:r>
+            <a:r>
+              <a:rPr lang="en-GB" baseline="0" dirty="0" err="1" smtClean="0"/>
+              <a:t>pasters</a:t>
+            </a:r>
+            <a:r>
+              <a:rPr lang="en-GB" baseline="0" dirty="0" smtClean="0"/>
+              <a:t>. EMET Protect Rundll32.exe.</a:t>
+            </a:r>
+            <a:endParaRPr lang="en-GB" baseline="0" dirty="0" smtClean="0"/>
           </a:p>
           <a:p>
             <a:endParaRPr lang="en-GB" baseline="0" dirty="0" smtClean="0"/>
@@ -919,7 +932,6 @@
               <a:rPr lang="en-GB" baseline="0" dirty="0" smtClean="0"/>
               <a:t>The Empire payload will make use of the popular download cradle to connect to your server and pull the second stage of the payload. This payload however, runs in pure PowerShell and does not need to inject shell code. This payload fails when PowerShell.exe is blocked.</a:t>
             </a:r>
-            <a:endParaRPr lang="en-GB" baseline="0" dirty="0" smtClean="0"/>
           </a:p>
         </p:txBody>
       </p:sp>
@@ -1027,7 +1039,6 @@
               <a:rPr lang="en-GB" baseline="0" dirty="0" smtClean="0"/>
               <a:t>, Cobalt Strike or Empire for capturing call backs.</a:t>
             </a:r>
-            <a:endParaRPr lang="en-GB" baseline="0" dirty="0" smtClean="0"/>
           </a:p>
         </p:txBody>
       </p:sp>
@@ -1212,7 +1223,6 @@
               <a:rPr lang="en-GB" baseline="0" dirty="0" smtClean="0"/>
               <a:t>I will write this later.</a:t>
             </a:r>
-            <a:endParaRPr lang="en-GB" baseline="0" dirty="0" smtClean="0"/>
           </a:p>
         </p:txBody>
       </p:sp>
@@ -1521,7 +1531,7 @@
               <a:pPr lvl="0">
                 <a:defRPr sz="3200"/>
               </a:pPr>
-              <a:endParaRPr sz="3200"/>
+              <a:endParaRPr sz="3200" dirty="0"/>
             </a:p>
           </p:txBody>
         </p:sp>
@@ -1558,7 +1568,7 @@
               <a:pPr lvl="0">
                 <a:defRPr sz="3200"/>
               </a:pPr>
-              <a:endParaRPr sz="3200"/>
+              <a:endParaRPr sz="3200" dirty="0"/>
             </a:p>
           </p:txBody>
         </p:sp>
@@ -1591,7 +1601,7 @@
             <a:pPr lvl="0">
               <a:defRPr sz="3200"/>
             </a:pPr>
-            <a:endParaRPr sz="3200"/>
+            <a:endParaRPr sz="3200" dirty="0"/>
           </a:p>
         </p:txBody>
       </p:sp>
@@ -2059,7 +2069,7 @@
               <a:pPr lvl="0">
                 <a:defRPr sz="3200"/>
               </a:pPr>
-              <a:endParaRPr sz="3200"/>
+              <a:endParaRPr sz="3200" dirty="0"/>
             </a:p>
           </p:txBody>
         </p:sp>
@@ -2096,7 +2106,7 @@
               <a:pPr lvl="0">
                 <a:defRPr sz="3200"/>
               </a:pPr>
-              <a:endParaRPr sz="3200"/>
+              <a:endParaRPr sz="3200" dirty="0"/>
             </a:p>
           </p:txBody>
         </p:sp>
@@ -2129,7 +2139,7 @@
             <a:pPr lvl="0">
               <a:defRPr sz="3200"/>
             </a:pPr>
-            <a:endParaRPr sz="3200"/>
+            <a:endParaRPr sz="3200" dirty="0"/>
           </a:p>
         </p:txBody>
       </p:sp>
@@ -2490,7 +2500,7 @@
               <a:pPr lvl="0">
                 <a:defRPr sz="3200"/>
               </a:pPr>
-              <a:endParaRPr sz="3200"/>
+              <a:endParaRPr sz="3200" dirty="0"/>
             </a:p>
           </p:txBody>
         </p:sp>
@@ -2527,7 +2537,7 @@
               <a:pPr lvl="0">
                 <a:defRPr sz="3200"/>
               </a:pPr>
-              <a:endParaRPr sz="3200"/>
+              <a:endParaRPr sz="3200" dirty="0"/>
             </a:p>
           </p:txBody>
         </p:sp>
@@ -2560,7 +2570,7 @@
             <a:pPr lvl="0">
               <a:defRPr sz="3200"/>
             </a:pPr>
-            <a:endParaRPr sz="3200"/>
+            <a:endParaRPr sz="3200" dirty="0"/>
           </a:p>
         </p:txBody>
       </p:sp>
@@ -2906,7 +2916,7 @@
               <a:pPr/>
               <a:t>‹#›</a:t>
             </a:fld>
-            <a:endParaRPr lang="en-GB"/>
+            <a:endParaRPr lang="en-GB" dirty="0"/>
           </a:p>
         </p:txBody>
       </p:sp>
@@ -2957,7 +2967,7 @@
               <a:pPr lvl="0">
                 <a:defRPr sz="3200"/>
               </a:pPr>
-              <a:endParaRPr sz="3200"/>
+              <a:endParaRPr sz="3200" dirty="0"/>
             </a:p>
           </p:txBody>
         </p:sp>
@@ -2994,7 +3004,7 @@
               <a:pPr lvl="0">
                 <a:defRPr sz="3200"/>
               </a:pPr>
-              <a:endParaRPr sz="3200"/>
+              <a:endParaRPr sz="3200" dirty="0"/>
             </a:p>
           </p:txBody>
         </p:sp>
@@ -3027,7 +3037,7 @@
             <a:pPr lvl="0">
               <a:defRPr sz="3200"/>
             </a:pPr>
-            <a:endParaRPr sz="3200"/>
+            <a:endParaRPr sz="3200" dirty="0"/>
           </a:p>
         </p:txBody>
       </p:sp>
@@ -3691,7 +3701,7 @@
               <a:pPr lvl="0">
                 <a:defRPr sz="3200"/>
               </a:pPr>
-              <a:endParaRPr sz="3200"/>
+              <a:endParaRPr sz="3200" dirty="0"/>
             </a:p>
           </p:txBody>
         </p:sp>
@@ -3728,7 +3738,7 @@
               <a:pPr lvl="0">
                 <a:defRPr sz="3200"/>
               </a:pPr>
-              <a:endParaRPr sz="3200"/>
+              <a:endParaRPr sz="3200" dirty="0"/>
             </a:p>
           </p:txBody>
         </p:sp>
@@ -3761,7 +3771,7 @@
             <a:pPr lvl="0">
               <a:defRPr sz="3200"/>
             </a:pPr>
-            <a:endParaRPr sz="3200"/>
+            <a:endParaRPr sz="3200" dirty="0"/>
           </a:p>
         </p:txBody>
       </p:sp>
@@ -3942,7 +3952,7 @@
             <a:fld id="{86CB4B4D-7CA3-9044-876B-883B54F8677D}" type="slidenum">
               <a:t>‹#›</a:t>
             </a:fld>
-            <a:endParaRPr/>
+            <a:endParaRPr dirty="0"/>
           </a:p>
         </p:txBody>
       </p:sp>
@@ -4202,7 +4212,7 @@
               <a:pPr lvl="0">
                 <a:defRPr sz="3200"/>
               </a:pPr>
-              <a:endParaRPr sz="3200"/>
+              <a:endParaRPr sz="3200" dirty="0"/>
             </a:p>
           </p:txBody>
         </p:sp>
@@ -4239,7 +4249,7 @@
               <a:pPr lvl="0">
                 <a:defRPr sz="3200"/>
               </a:pPr>
-              <a:endParaRPr sz="3200"/>
+              <a:endParaRPr sz="3200" dirty="0"/>
             </a:p>
           </p:txBody>
         </p:sp>
@@ -4272,7 +4282,7 @@
             <a:pPr lvl="0">
               <a:defRPr sz="3200"/>
             </a:pPr>
-            <a:endParaRPr sz="3200"/>
+            <a:endParaRPr sz="3200" dirty="0"/>
           </a:p>
         </p:txBody>
       </p:sp>
@@ -4453,7 +4463,7 @@
             <a:fld id="{86CB4B4D-7CA3-9044-876B-883B54F8677D}" type="slidenum">
               <a:t>‹#›</a:t>
             </a:fld>
-            <a:endParaRPr/>
+            <a:endParaRPr dirty="0"/>
           </a:p>
         </p:txBody>
       </p:sp>
@@ -4617,7 +4627,7 @@
               <a:pPr lvl="0">
                 <a:defRPr sz="3200"/>
               </a:pPr>
-              <a:endParaRPr sz="3200"/>
+              <a:endParaRPr sz="3200" dirty="0"/>
             </a:p>
           </p:txBody>
         </p:sp>
@@ -4654,7 +4664,7 @@
               <a:pPr lvl="0">
                 <a:defRPr sz="3200"/>
               </a:pPr>
-              <a:endParaRPr sz="3200"/>
+              <a:endParaRPr sz="3200" dirty="0"/>
             </a:p>
           </p:txBody>
         </p:sp>
@@ -4687,7 +4697,7 @@
             <a:pPr lvl="0">
               <a:defRPr sz="3200"/>
             </a:pPr>
-            <a:endParaRPr sz="3200"/>
+            <a:endParaRPr sz="3200" dirty="0"/>
           </a:p>
         </p:txBody>
       </p:sp>
@@ -5368,7 +5378,6 @@
               <a:rPr lang="en-GB" dirty="0"/>
               <a:t>One Template To Rule Them All</a:t>
             </a:r>
-            <a:endParaRPr lang="en-GB" dirty="0"/>
           </a:p>
         </p:txBody>
       </p:sp>
@@ -5432,11 +5441,11 @@
             </a:pPr>
             <a:r>
               <a:rPr lang="en-GB" dirty="0" smtClean="0"/>
-              <a:t>22</a:t>
+              <a:t>29</a:t>
             </a:r>
             <a:r>
               <a:rPr lang="en-GB" baseline="30000" dirty="0" smtClean="0"/>
-              <a:t>nd</a:t>
+              <a:t>th</a:t>
             </a:r>
             <a:r>
               <a:rPr lang="en-GB" dirty="0" smtClean="0"/>
@@ -6617,10 +6626,8 @@
                 </a:solidFill>
                 <a:latin typeface="+mj-lt"/>
               </a:rPr>
-              <a:t>Inject into Rundll32 (32 Bit)</a:t>
-            </a:r>
-          </a:p>
-          <a:p>
+              <a:t>Inject into Rundll32 (32 Bit</a:t>
+            </a:r>
             <a:r>
               <a:rPr lang="en-GB" sz="6000" dirty="0" smtClean="0">
                 <a:solidFill>
@@ -6628,7 +6635,35 @@
                 </a:solidFill>
                 <a:latin typeface="+mj-lt"/>
               </a:rPr>
-              <a:t>PowerShell Native</a:t>
+              <a:t>)</a:t>
+            </a:r>
+          </a:p>
+          <a:p>
+            <a:r>
+              <a:rPr lang="en-GB" sz="6000" dirty="0" smtClean="0">
+                <a:solidFill>
+                  <a:schemeClr val="bg1"/>
+                </a:solidFill>
+                <a:latin typeface="+mj-lt"/>
+              </a:rPr>
+              <a:t>EMET Protect Rundll32.exe</a:t>
+            </a:r>
+            <a:endParaRPr lang="en-GB" sz="6000" dirty="0" smtClean="0">
+              <a:solidFill>
+                <a:schemeClr val="bg1"/>
+              </a:solidFill>
+              <a:latin typeface="+mj-lt"/>
+            </a:endParaRPr>
+          </a:p>
+          <a:p>
+            <a:r>
+              <a:rPr lang="en-GB" sz="6000" dirty="0" smtClean="0">
+                <a:solidFill>
+                  <a:schemeClr val="bg1"/>
+                </a:solidFill>
+                <a:latin typeface="+mj-lt"/>
+              </a:rPr>
+              <a:t>Native PowerShell</a:t>
             </a:r>
             <a:endParaRPr lang="en-GB" sz="6000" dirty="0">
               <a:solidFill>
@@ -6662,15 +6697,7 @@
                   <a:schemeClr val="bg2"/>
                 </a:solidFill>
               </a:rPr>
-              <a:t>Current Macro Payloads (Cobalt Strike / Empire</a:t>
-            </a:r>
-            <a:r>
-              <a:rPr lang="en-GB" sz="3600" dirty="0" smtClean="0">
-                <a:solidFill>
-                  <a:schemeClr val="bg2"/>
-                </a:solidFill>
-              </a:rPr>
-              <a:t>)</a:t>
+              <a:t>Current Macro Payloads (Cobalt Strike / Empire)</a:t>
             </a:r>
             <a:endParaRPr lang="en-GB" sz="3600" dirty="0">
               <a:solidFill>
@@ -6680,6 +6707,77 @@
           </a:p>
         </p:txBody>
       </p:sp>
+      <p:pic>
+        <p:nvPicPr>
+          <p:cNvPr id="2" name="Picture 1"/>
+          <p:cNvPicPr>
+            <a:picLocks noChangeAspect="1"/>
+          </p:cNvPicPr>
+          <p:nvPr/>
+        </p:nvPicPr>
+        <p:blipFill>
+          <a:blip r:embed="rId3">
+            <a:extLst>
+              <a:ext uri="{28A0092B-C50C-407E-A947-70E740481C1C}">
+                <a14:useLocalDpi xmlns:a14="http://schemas.microsoft.com/office/drawing/2010/main" val="0"/>
+              </a:ext>
+            </a:extLst>
+          </a:blip>
+          <a:stretch>
+            <a:fillRect/>
+          </a:stretch>
+        </p:blipFill>
+        <p:spPr>
+          <a:xfrm>
+            <a:off x="14551862" y="6348277"/>
+            <a:ext cx="8976380" cy="5909160"/>
+          </a:xfrm>
+          <a:prstGeom prst="rect">
+            <a:avLst/>
+          </a:prstGeom>
+        </p:spPr>
+      </p:pic>
+      <p:pic>
+        <p:nvPicPr>
+          <p:cNvPr id="1026" name="Picture 2" descr="http://4.bp.blogspot.com/-dDoWUcaMEf0/VLvMv4JbhHI/AAAAAAAAAXI/CD6rMFxVulc/s1600/script%2Bkiddies.jpg"/>
+          <p:cNvPicPr>
+            <a:picLocks noChangeAspect="1" noChangeArrowheads="1"/>
+          </p:cNvPicPr>
+          <p:nvPr/>
+        </p:nvPicPr>
+        <p:blipFill>
+          <a:blip r:embed="rId4">
+            <a:extLst>
+              <a:ext uri="{28A0092B-C50C-407E-A947-70E740481C1C}">
+                <a14:useLocalDpi xmlns:a14="http://schemas.microsoft.com/office/drawing/2010/main" val="0"/>
+              </a:ext>
+            </a:extLst>
+          </a:blip>
+          <a:srcRect/>
+          <a:stretch>
+            <a:fillRect/>
+          </a:stretch>
+        </p:blipFill>
+        <p:spPr bwMode="auto">
+          <a:xfrm>
+            <a:off x="16681154" y="4663519"/>
+            <a:ext cx="5503819" cy="8270766"/>
+          </a:xfrm>
+          <a:prstGeom prst="rect">
+            <a:avLst/>
+          </a:prstGeom>
+          <a:noFill/>
+          <a:extLst>
+            <a:ext uri="{909E8E84-426E-40DD-AFC4-6F175D3DCCD1}">
+              <a14:hiddenFill xmlns:a14="http://schemas.microsoft.com/office/drawing/2010/main">
+                <a:solidFill>
+                  <a:srgbClr val="FFFFFF"/>
+                </a:solidFill>
+              </a14:hiddenFill>
+            </a:ext>
+          </a:extLst>
+        </p:spPr>
+      </p:pic>
     </p:spTree>
     <p:extLst>
       <p:ext uri="{BB962C8B-B14F-4D97-AF65-F5344CB8AC3E}">
@@ -6715,7 +6813,7 @@
                             </p:stCondLst>
                             <p:childTnLst>
                               <p:par>
-                                <p:cTn id="5" presetID="9" presetClass="emph" presetSubtype="0" nodeType="withEffect">
+                                <p:cTn id="5" presetID="9" presetClass="emph" presetSubtype="0" grpId="0" nodeType="withEffect">
                                   <p:stCondLst>
                                     <p:cond delay="0"/>
                                   </p:stCondLst>
@@ -6754,7 +6852,7 @@
                                 </p:cTn>
                               </p:par>
                               <p:par>
-                                <p:cTn id="8" presetID="9" presetClass="emph" presetSubtype="0" nodeType="withEffect">
+                                <p:cTn id="8" presetID="9" presetClass="emph" presetSubtype="0" grpId="0" nodeType="withEffect">
                                   <p:stCondLst>
                                     <p:cond delay="0"/>
                                   </p:stCondLst>
@@ -6792,6 +6890,76 @@
                                   </p:childTnLst>
                                 </p:cTn>
                               </p:par>
+                              <p:par>
+                                <p:cTn id="11" presetID="9" presetClass="emph" presetSubtype="0" grpId="0" nodeType="withEffect">
+                                  <p:stCondLst>
+                                    <p:cond delay="0"/>
+                                  </p:stCondLst>
+                                  <p:childTnLst>
+                                    <p:set>
+                                      <p:cBhvr rctx="PPT">
+                                        <p:cTn id="12" dur="indefinite"/>
+                                        <p:tgtEl>
+                                          <p:spTgt spid="6">
+                                            <p:txEl>
+                                              <p:pRg st="2" end="2"/>
+                                            </p:txEl>
+                                          </p:spTgt>
+                                        </p:tgtEl>
+                                        <p:attrNameLst>
+                                          <p:attrName>style.opacity</p:attrName>
+                                        </p:attrNameLst>
+                                      </p:cBhvr>
+                                      <p:to>
+                                        <p:strVal val="0.25"/>
+                                      </p:to>
+                                    </p:set>
+                                    <p:animEffect filter="image" prLst="opacity: 0.25">
+                                      <p:cBhvr rctx="IE">
+                                        <p:cTn id="13" dur="indefinite"/>
+                                        <p:tgtEl>
+                                          <p:spTgt spid="6">
+                                            <p:txEl>
+                                              <p:pRg st="2" end="2"/>
+                                            </p:txEl>
+                                          </p:spTgt>
+                                        </p:tgtEl>
+                                      </p:cBhvr>
+                                    </p:animEffect>
+                                  </p:childTnLst>
+                                </p:cTn>
+                              </p:par>
+                              <p:par>
+                                <p:cTn id="14" presetID="9" presetClass="emph" presetSubtype="0" nodeType="withEffect">
+                                  <p:stCondLst>
+                                    <p:cond delay="0"/>
+                                  </p:stCondLst>
+                                  <p:childTnLst>
+                                    <p:set>
+                                      <p:cBhvr rctx="PPT">
+                                        <p:cTn id="15" dur="indefinite"/>
+                                        <p:tgtEl>
+                                          <p:spTgt spid="2"/>
+                                        </p:tgtEl>
+                                        <p:attrNameLst>
+                                          <p:attrName>style.opacity</p:attrName>
+                                        </p:attrNameLst>
+                                      </p:cBhvr>
+                                      <p:to>
+                                        <p:strVal val="0.25"/>
+                                      </p:to>
+                                    </p:set>
+                                    <p:animEffect filter="image" prLst="opacity: 0.25">
+                                      <p:cBhvr rctx="IE">
+                                        <p:cTn id="16" dur="indefinite"/>
+                                        <p:tgtEl>
+                                          <p:spTgt spid="2"/>
+                                        </p:tgtEl>
+                                      </p:cBhvr>
+                                    </p:animEffect>
+                                  </p:childTnLst>
+                                </p:cTn>
+                              </p:par>
                             </p:childTnLst>
                           </p:cTn>
                         </p:par>
@@ -6799,26 +6967,26 @@
                     </p:cTn>
                   </p:par>
                   <p:par>
-                    <p:cTn id="11" fill="hold">
+                    <p:cTn id="17" fill="hold">
                       <p:stCondLst>
                         <p:cond delay="indefinite"/>
                       </p:stCondLst>
                       <p:childTnLst>
                         <p:par>
-                          <p:cTn id="12" fill="hold">
+                          <p:cTn id="18" fill="hold">
                             <p:stCondLst>
                               <p:cond delay="0"/>
                             </p:stCondLst>
                             <p:childTnLst>
                               <p:par>
-                                <p:cTn id="13" presetID="9" presetClass="emph" presetSubtype="0" nodeType="clickEffect">
+                                <p:cTn id="19" presetID="9" presetClass="emph" presetSubtype="0" nodeType="clickEffect">
                                   <p:stCondLst>
                                     <p:cond delay="0"/>
                                   </p:stCondLst>
                                   <p:childTnLst>
                                     <p:set>
                                       <p:cBhvr rctx="PPT">
-                                        <p:cTn id="14" dur="indefinite"/>
+                                        <p:cTn id="20" dur="indefinite"/>
                                         <p:tgtEl>
                                           <p:spTgt spid="6">
                                             <p:txEl>
@@ -6836,7 +7004,7 @@
                                     </p:set>
                                     <p:animEffect filter="image" prLst="opacity: 0.25">
                                       <p:cBhvr rctx="IE">
-                                        <p:cTn id="15" dur="indefinite"/>
+                                        <p:cTn id="21" dur="indefinite"/>
                                         <p:tgtEl>
                                           <p:spTgt spid="6">
                                             <p:txEl>
@@ -6850,14 +7018,14 @@
                                 </p:cTn>
                               </p:par>
                               <p:par>
-                                <p:cTn id="16" presetID="9" presetClass="emph" presetSubtype="0" nodeType="withEffect">
+                                <p:cTn id="22" presetID="9" presetClass="emph" presetSubtype="0" nodeType="withEffect">
                                   <p:stCondLst>
                                     <p:cond delay="0"/>
                                   </p:stCondLst>
                                   <p:childTnLst>
                                     <p:set>
                                       <p:cBhvr rctx="PPT">
-                                        <p:cTn id="17" dur="indefinite"/>
+                                        <p:cTn id="23" dur="indefinite"/>
                                         <p:tgtEl>
                                           <p:spTgt spid="6">
                                             <p:txEl>
@@ -6875,7 +7043,7 @@
                                     </p:set>
                                     <p:animEffect filter="image" prLst="opacity: 1">
                                       <p:cBhvr rctx="IE">
-                                        <p:cTn id="18" dur="indefinite"/>
+                                        <p:cTn id="24" dur="indefinite"/>
                                         <p:tgtEl>
                                           <p:spTgt spid="6">
                                             <p:txEl>
@@ -6885,6 +7053,282 @@
                                         </p:tgtEl>
                                       </p:cBhvr>
                                     </p:animEffect>
+                                  </p:childTnLst>
+                                </p:cTn>
+                              </p:par>
+                              <p:par>
+                                <p:cTn id="25" presetID="9" presetClass="emph" presetSubtype="0" nodeType="withEffect">
+                                  <p:stCondLst>
+                                    <p:cond delay="0"/>
+                                  </p:stCondLst>
+                                  <p:childTnLst>
+                                    <p:set>
+                                      <p:cBhvr rctx="PPT">
+                                        <p:cTn id="26" dur="indefinite"/>
+                                        <p:tgtEl>
+                                          <p:spTgt spid="2"/>
+                                        </p:tgtEl>
+                                        <p:attrNameLst>
+                                          <p:attrName>style.opacity</p:attrName>
+                                        </p:attrNameLst>
+                                      </p:cBhvr>
+                                      <p:to>
+                                        <p:strVal val="1"/>
+                                      </p:to>
+                                    </p:set>
+                                    <p:animEffect filter="image" prLst="opacity: 1">
+                                      <p:cBhvr rctx="IE">
+                                        <p:cTn id="27" dur="indefinite"/>
+                                        <p:tgtEl>
+                                          <p:spTgt spid="2"/>
+                                        </p:tgtEl>
+                                      </p:cBhvr>
+                                    </p:animEffect>
+                                  </p:childTnLst>
+                                </p:cTn>
+                              </p:par>
+                            </p:childTnLst>
+                          </p:cTn>
+                        </p:par>
+                      </p:childTnLst>
+                    </p:cTn>
+                  </p:par>
+                  <p:par>
+                    <p:cTn id="28" fill="hold">
+                      <p:stCondLst>
+                        <p:cond delay="indefinite"/>
+                      </p:stCondLst>
+                      <p:childTnLst>
+                        <p:par>
+                          <p:cTn id="29" fill="hold">
+                            <p:stCondLst>
+                              <p:cond delay="0"/>
+                            </p:stCondLst>
+                            <p:childTnLst>
+                              <p:par>
+                                <p:cTn id="30" presetID="2" presetClass="entr" presetSubtype="4" fill="hold" nodeType="clickEffect">
+                                  <p:stCondLst>
+                                    <p:cond delay="0"/>
+                                  </p:stCondLst>
+                                  <p:childTnLst>
+                                    <p:set>
+                                      <p:cBhvr>
+                                        <p:cTn id="31" dur="1" fill="hold">
+                                          <p:stCondLst>
+                                            <p:cond delay="0"/>
+                                          </p:stCondLst>
+                                        </p:cTn>
+                                        <p:tgtEl>
+                                          <p:spTgt spid="1026"/>
+                                        </p:tgtEl>
+                                        <p:attrNameLst>
+                                          <p:attrName>style.visibility</p:attrName>
+                                        </p:attrNameLst>
+                                      </p:cBhvr>
+                                      <p:to>
+                                        <p:strVal val="visible"/>
+                                      </p:to>
+                                    </p:set>
+                                    <p:anim calcmode="lin" valueType="num">
+                                      <p:cBhvr additive="base">
+                                        <p:cTn id="32" dur="500" fill="hold"/>
+                                        <p:tgtEl>
+                                          <p:spTgt spid="1026"/>
+                                        </p:tgtEl>
+                                        <p:attrNameLst>
+                                          <p:attrName>ppt_x</p:attrName>
+                                        </p:attrNameLst>
+                                      </p:cBhvr>
+                                      <p:tavLst>
+                                        <p:tav tm="0">
+                                          <p:val>
+                                            <p:strVal val="#ppt_x"/>
+                                          </p:val>
+                                        </p:tav>
+                                        <p:tav tm="100000">
+                                          <p:val>
+                                            <p:strVal val="#ppt_x"/>
+                                          </p:val>
+                                        </p:tav>
+                                      </p:tavLst>
+                                    </p:anim>
+                                    <p:anim calcmode="lin" valueType="num">
+                                      <p:cBhvr additive="base">
+                                        <p:cTn id="33" dur="500" fill="hold"/>
+                                        <p:tgtEl>
+                                          <p:spTgt spid="1026"/>
+                                        </p:tgtEl>
+                                        <p:attrNameLst>
+                                          <p:attrName>ppt_y</p:attrName>
+                                        </p:attrNameLst>
+                                      </p:cBhvr>
+                                      <p:tavLst>
+                                        <p:tav tm="0">
+                                          <p:val>
+                                            <p:strVal val="1+#ppt_h/2"/>
+                                          </p:val>
+                                        </p:tav>
+                                        <p:tav tm="100000">
+                                          <p:val>
+                                            <p:strVal val="#ppt_y"/>
+                                          </p:val>
+                                        </p:tav>
+                                      </p:tavLst>
+                                    </p:anim>
+                                  </p:childTnLst>
+                                </p:cTn>
+                              </p:par>
+                            </p:childTnLst>
+                          </p:cTn>
+                        </p:par>
+                      </p:childTnLst>
+                    </p:cTn>
+                  </p:par>
+                  <p:par>
+                    <p:cTn id="34" fill="hold">
+                      <p:stCondLst>
+                        <p:cond delay="indefinite"/>
+                      </p:stCondLst>
+                      <p:childTnLst>
+                        <p:par>
+                          <p:cTn id="35" fill="hold">
+                            <p:stCondLst>
+                              <p:cond delay="0"/>
+                            </p:stCondLst>
+                            <p:childTnLst>
+                              <p:par>
+                                <p:cTn id="36" presetID="9" presetClass="emph" presetSubtype="0" nodeType="clickEffect">
+                                  <p:stCondLst>
+                                    <p:cond delay="0"/>
+                                  </p:stCondLst>
+                                  <p:childTnLst>
+                                    <p:set>
+                                      <p:cBhvr rctx="PPT">
+                                        <p:cTn id="37" dur="indefinite"/>
+                                        <p:tgtEl>
+                                          <p:spTgt spid="6">
+                                            <p:txEl>
+                                              <p:pRg st="1" end="1"/>
+                                            </p:txEl>
+                                          </p:spTgt>
+                                        </p:tgtEl>
+                                        <p:attrNameLst>
+                                          <p:attrName>style.opacity</p:attrName>
+                                        </p:attrNameLst>
+                                      </p:cBhvr>
+                                      <p:to>
+                                        <p:strVal val="0.25"/>
+                                      </p:to>
+                                    </p:set>
+                                    <p:animEffect filter="image" prLst="opacity: 0.25">
+                                      <p:cBhvr rctx="IE">
+                                        <p:cTn id="38" dur="indefinite"/>
+                                        <p:tgtEl>
+                                          <p:spTgt spid="6">
+                                            <p:txEl>
+                                              <p:pRg st="1" end="1"/>
+                                            </p:txEl>
+                                          </p:spTgt>
+                                        </p:tgtEl>
+                                      </p:cBhvr>
+                                    </p:animEffect>
+                                  </p:childTnLst>
+                                </p:cTn>
+                              </p:par>
+                              <p:par>
+                                <p:cTn id="39" presetID="9" presetClass="emph" presetSubtype="0" nodeType="withEffect">
+                                  <p:stCondLst>
+                                    <p:cond delay="0"/>
+                                  </p:stCondLst>
+                                  <p:childTnLst>
+                                    <p:set>
+                                      <p:cBhvr rctx="PPT">
+                                        <p:cTn id="40" dur="indefinite"/>
+                                        <p:tgtEl>
+                                          <p:spTgt spid="6">
+                                            <p:txEl>
+                                              <p:pRg st="2" end="2"/>
+                                            </p:txEl>
+                                          </p:spTgt>
+                                        </p:tgtEl>
+                                        <p:attrNameLst>
+                                          <p:attrName>style.opacity</p:attrName>
+                                        </p:attrNameLst>
+                                      </p:cBhvr>
+                                      <p:to>
+                                        <p:strVal val="1"/>
+                                      </p:to>
+                                    </p:set>
+                                    <p:animEffect filter="image" prLst="opacity: 1">
+                                      <p:cBhvr rctx="IE">
+                                        <p:cTn id="41" dur="indefinite"/>
+                                        <p:tgtEl>
+                                          <p:spTgt spid="6">
+                                            <p:txEl>
+                                              <p:pRg st="2" end="2"/>
+                                            </p:txEl>
+                                          </p:spTgt>
+                                        </p:tgtEl>
+                                      </p:cBhvr>
+                                    </p:animEffect>
+                                  </p:childTnLst>
+                                </p:cTn>
+                              </p:par>
+                              <p:par>
+                                <p:cTn id="42" presetID="9" presetClass="emph" presetSubtype="0" nodeType="withEffect">
+                                  <p:stCondLst>
+                                    <p:cond delay="0"/>
+                                  </p:stCondLst>
+                                  <p:childTnLst>
+                                    <p:set>
+                                      <p:cBhvr rctx="PPT">
+                                        <p:cTn id="43" dur="indefinite"/>
+                                        <p:tgtEl>
+                                          <p:spTgt spid="2"/>
+                                        </p:tgtEl>
+                                        <p:attrNameLst>
+                                          <p:attrName>style.opacity</p:attrName>
+                                        </p:attrNameLst>
+                                      </p:cBhvr>
+                                      <p:to>
+                                        <p:strVal val="0.25"/>
+                                      </p:to>
+                                    </p:set>
+                                    <p:animEffect filter="image" prLst="opacity: 0.25">
+                                      <p:cBhvr rctx="IE">
+                                        <p:cTn id="44" dur="indefinite"/>
+                                        <p:tgtEl>
+                                          <p:spTgt spid="2"/>
+                                        </p:tgtEl>
+                                      </p:cBhvr>
+                                    </p:animEffect>
+                                  </p:childTnLst>
+                                </p:cTn>
+                              </p:par>
+                              <p:par>
+                                <p:cTn id="45" presetID="1" presetClass="exit" presetSubtype="0" fill="hold" nodeType="withEffect">
+                                  <p:stCondLst>
+                                    <p:cond delay="0"/>
+                                  </p:stCondLst>
+                                  <p:childTnLst>
+                                    <p:set>
+                                      <p:cBhvr>
+                                        <p:cTn id="46" dur="1" fill="hold">
+                                          <p:stCondLst>
+                                            <p:cond delay="0"/>
+                                          </p:stCondLst>
+                                        </p:cTn>
+                                        <p:tgtEl>
+                                          <p:spTgt spid="1026"/>
+                                        </p:tgtEl>
+                                        <p:attrNameLst>
+                                          <p:attrName>style.visibility</p:attrName>
+                                        </p:attrNameLst>
+                                      </p:cBhvr>
+                                      <p:to>
+                                        <p:strVal val="hidden"/>
+                                      </p:to>
+                                    </p:set>
                                   </p:childTnLst>
                                 </p:cTn>
                               </p:par>
@@ -6915,6 +7359,9 @@
         </p:cTn>
       </p:par>
     </p:tnLst>
+    <p:bldLst>
+      <p:bldP spid="6" grpId="0" build="p"/>
+    </p:bldLst>
   </p:timing>
 </p:sld>
 </file>
@@ -7856,8 +8303,14 @@
                 </a:solidFill>
                 <a:latin typeface="+mj-lt"/>
               </a:rPr>
-              <a:t>Native VBA Injection</a:t>
-            </a:r>
+              <a:t>Injection via Native VBA</a:t>
+            </a:r>
+            <a:endParaRPr lang="en-GB" sz="6000" dirty="0" smtClean="0">
+              <a:solidFill>
+                <a:schemeClr val="bg1"/>
+              </a:solidFill>
+              <a:latin typeface="+mj-lt"/>
+            </a:endParaRPr>
           </a:p>
           <a:p>
             <a:endParaRPr lang="en-GB" sz="6000" dirty="0">
@@ -8453,6 +8906,14 @@
           <a:lstStyle/>
           <a:p>
             <a:r>
+              <a:rPr lang="en-GB" dirty="0" smtClean="0">
+                <a:solidFill>
+                  <a:schemeClr val="bg1"/>
+                </a:solidFill>
+              </a:rPr>
+              <a:t>Anti-</a:t>
+            </a:r>
+            <a:r>
               <a:rPr lang="en-GB" dirty="0" err="1" smtClean="0">
                 <a:solidFill>
                   <a:schemeClr val="bg1"/>
@@ -8817,6 +9278,14 @@
           <a:bodyPr/>
           <a:lstStyle/>
           <a:p>
+            <a:r>
+              <a:rPr lang="en-GB" dirty="0" smtClean="0">
+                <a:solidFill>
+                  <a:schemeClr val="bg1"/>
+                </a:solidFill>
+              </a:rPr>
+              <a:t>Anti-</a:t>
+            </a:r>
             <a:r>
               <a:rPr lang="en-GB" dirty="0" err="1" smtClean="0">
                 <a:solidFill>

</xml_diff>

<commit_message>
Additional Material and Changes
</commit_message>
<xml_diff>
--- a/one-template-to-rule-them-all_emet-part.pptx
+++ b/one-template-to-rule-them-all_emet-part.pptx
@@ -685,7 +685,6 @@
               <a:rPr lang="en-GB" baseline="0" dirty="0" smtClean="0"/>
               <a:t>Create Remote Thread basically instantiates and runs the shell code we injected.</a:t>
             </a:r>
-            <a:endParaRPr lang="en-GB" baseline="0" dirty="0" smtClean="0"/>
           </a:p>
         </p:txBody>
       </p:sp>
@@ -780,7 +779,6 @@
               <a:rPr lang="en-GB" baseline="0" dirty="0" smtClean="0"/>
               <a:t>It will terminate the process if a suspended process is made but for some reason defences stopped it from being able to create a connection back to our C2 server.</a:t>
             </a:r>
-            <a:endParaRPr lang="en-GB" baseline="0" dirty="0" smtClean="0"/>
           </a:p>
         </p:txBody>
       </p:sp>
@@ -1103,11 +1101,7 @@
           <a:p>
             <a:r>
               <a:rPr lang="en-GB" baseline="0" dirty="0" smtClean="0"/>
-              <a:t>As the script tells us, we must start up our listeners. So we do that </a:t>
-            </a:r>
-            <a:r>
-              <a:rPr lang="en-GB" baseline="0" dirty="0" smtClean="0"/>
-              <a:t>on the left now.</a:t>
+              <a:t>As the script tells us, we must start up our listeners. So we do that on the left now.</a:t>
             </a:r>
           </a:p>
           <a:p>
@@ -1312,11 +1306,7 @@
           <a:p>
             <a:r>
               <a:rPr lang="en-GB" baseline="0" dirty="0" smtClean="0"/>
-              <a:t>In </a:t>
-            </a:r>
-            <a:r>
-              <a:rPr lang="en-GB" baseline="0" dirty="0" smtClean="0"/>
-              <a:t>the case of EMET, </a:t>
+              <a:t>In the case of EMET, </a:t>
             </a:r>
             <a:r>
               <a:rPr lang="en-GB" baseline="0" dirty="0" err="1" smtClean="0"/>
@@ -1363,11 +1353,7 @@
             </a:r>
             <a:r>
               <a:rPr lang="en-GB" baseline="0" dirty="0" smtClean="0"/>
-              <a:t> creates a call back through the use of shell code injection. This is written in native VBA as we do not want to have a dependency on PowerShell</a:t>
-            </a:r>
-            <a:r>
-              <a:rPr lang="en-GB" baseline="0" dirty="0" smtClean="0"/>
-              <a:t>.</a:t>
+              <a:t> creates a call back through the use of shell code injection. This is written in native VBA as we do not want to have a dependency on PowerShell.</a:t>
             </a:r>
           </a:p>
           <a:p>
@@ -1412,7 +1398,6 @@
               <a:rPr lang="en-GB" baseline="0" dirty="0" smtClean="0"/>
               <a:t>We later found that using EMET protected paths on all binaries is not viable.</a:t>
             </a:r>
-            <a:endParaRPr lang="en-GB" baseline="0" dirty="0" smtClean="0"/>
           </a:p>
         </p:txBody>
       </p:sp>

</xml_diff>